<commit_message>
First Take at vocal
</commit_message>
<xml_diff>
--- a/Navigator Vocab Pairing.pptx
+++ b/Navigator Vocab Pairing.pptx
@@ -3133,7 +3133,7 @@
         </p:nvSpPr>
         <p:spPr>
           <a:xfrm>
-            <a:off x="1301451" y="-101448"/>
+            <a:off x="1322099" y="-111774"/>
             <a:ext cx="262662" cy="276999"/>
           </a:xfrm>
           <a:prstGeom prst="rect">
@@ -3200,7 +3200,84 @@
         </p:nvSpPr>
         <p:spPr>
           <a:xfrm>
-            <a:off x="2352118" y="6581769"/>
+            <a:off x="3629549" y="6565512"/>
+            <a:ext cx="340658" cy="276999"/>
+          </a:xfrm>
+          <a:prstGeom prst="rect">
+            <a:avLst/>
+          </a:prstGeom>
+          <a:noFill/>
+        </p:spPr>
+        <p:txBody>
+          <a:bodyPr wrap="none" lIns="91440" tIns="45720" rIns="91440" bIns="45720">
+            <a:spAutoFit/>
+          </a:bodyPr>
+          <a:lstStyle/>
+          <a:p>
+            <a:pPr algn="ctr"/>
+            <a:r>
+              <a:rPr lang="x-none" sz="1200" b="1" dirty="0" smtClean="0">
+                <a:ln w="18000">
+                  <a:solidFill>
+                    <a:schemeClr val="accent2">
+                      <a:satMod val="140000"/>
+                    </a:schemeClr>
+                  </a:solidFill>
+                  <a:prstDash val="solid"/>
+                  <a:miter lim="800000"/>
+                </a:ln>
+                <a:noFill/>
+                <a:effectLst>
+                  <a:glow rad="101600">
+                    <a:schemeClr val="bg1">
+                      <a:alpha val="75000"/>
+                    </a:schemeClr>
+                  </a:glow>
+                  <a:outerShdw blurRad="25500" dist="23000" dir="7020000" algn="tl">
+                    <a:srgbClr val="000000">
+                      <a:alpha val="50000"/>
+                    </a:srgbClr>
+                  </a:outerShdw>
+                </a:effectLst>
+              </a:rPr>
+              <a:t>18</a:t>
+            </a:r>
+            <a:endParaRPr lang="x-none" sz="1200" b="1" dirty="0">
+              <a:ln w="18000">
+                <a:solidFill>
+                  <a:schemeClr val="accent2">
+                    <a:satMod val="140000"/>
+                  </a:schemeClr>
+                </a:solidFill>
+                <a:prstDash val="solid"/>
+                <a:miter lim="800000"/>
+              </a:ln>
+              <a:noFill/>
+              <a:effectLst>
+                <a:glow rad="101600">
+                  <a:schemeClr val="bg1">
+                    <a:alpha val="75000"/>
+                  </a:schemeClr>
+                </a:glow>
+                <a:outerShdw blurRad="25500" dist="23000" dir="7020000" algn="tl">
+                  <a:srgbClr val="000000">
+                    <a:alpha val="50000"/>
+                  </a:srgbClr>
+                </a:outerShdw>
+              </a:effectLst>
+            </a:endParaRPr>
+          </a:p>
+        </p:txBody>
+      </p:sp>
+      <p:sp>
+        <p:nvSpPr>
+          <p:cNvPr id="8" name="Rectangle 7"/>
+          <p:cNvSpPr/>
+          <p:nvPr/>
+        </p:nvSpPr>
+        <p:spPr>
+          <a:xfrm>
+            <a:off x="2166904" y="103049"/>
             <a:ext cx="262662" cy="276999"/>
           </a:xfrm>
           <a:prstGeom prst="rect">
@@ -3235,7 +3312,7 @@
                   </a:outerShdw>
                 </a:effectLst>
               </a:rPr>
-              <a:t>2</a:t>
+              <a:t>4</a:t>
             </a:r>
             <a:endParaRPr lang="x-none" sz="1200" b="1" dirty="0">
               <a:ln w="18000">
@@ -3261,13 +3338,13 @@
       </p:sp>
       <p:sp>
         <p:nvSpPr>
-          <p:cNvPr id="8" name="Rectangle 7"/>
+          <p:cNvPr id="9" name="Rectangle 8"/>
           <p:cNvSpPr/>
           <p:nvPr/>
         </p:nvSpPr>
         <p:spPr>
           <a:xfrm>
-            <a:off x="2174329" y="102579"/>
+            <a:off x="2305660" y="241078"/>
             <a:ext cx="262662" cy="276999"/>
           </a:xfrm>
           <a:prstGeom prst="rect">
@@ -3302,7 +3379,7 @@
                   </a:outerShdw>
                 </a:effectLst>
               </a:rPr>
-              <a:t>3</a:t>
+              <a:t>7</a:t>
             </a:r>
             <a:endParaRPr lang="x-none" sz="1200" b="1" dirty="0">
               <a:ln w="18000">
@@ -3328,81 +3405,14 @@
       </p:sp>
       <p:sp>
         <p:nvSpPr>
-          <p:cNvPr id="9" name="Rectangle 8"/>
-          <p:cNvSpPr/>
-          <p:nvPr/>
-        </p:nvSpPr>
-        <p:spPr>
-          <a:xfrm>
-            <a:off x="2305660" y="241078"/>
-            <a:ext cx="262662" cy="276999"/>
-          </a:xfrm>
-          <a:prstGeom prst="rect">
-            <a:avLst/>
-          </a:prstGeom>
-          <a:noFill/>
-        </p:spPr>
-        <p:txBody>
-          <a:bodyPr wrap="none" lIns="91440" tIns="45720" rIns="91440" bIns="45720">
-            <a:spAutoFit/>
-          </a:bodyPr>
-          <a:lstStyle/>
-          <a:p>
-            <a:pPr algn="ctr"/>
-            <a:r>
-              <a:rPr lang="x-none" sz="1200" b="1" dirty="0">
-                <a:ln w="18000">
-                  <a:solidFill>
-                    <a:schemeClr val="accent2">
-                      <a:satMod val="140000"/>
-                    </a:schemeClr>
-                  </a:solidFill>
-                  <a:prstDash val="solid"/>
-                  <a:miter lim="800000"/>
-                </a:ln>
-                <a:noFill/>
-                <a:effectLst>
-                  <a:outerShdw blurRad="25500" dist="23000" dir="7020000" algn="tl">
-                    <a:srgbClr val="000000">
-                      <a:alpha val="50000"/>
-                    </a:srgbClr>
-                  </a:outerShdw>
-                </a:effectLst>
-              </a:rPr>
-              <a:t>4</a:t>
-            </a:r>
-            <a:endParaRPr lang="x-none" sz="1200" b="1" dirty="0">
-              <a:ln w="18000">
-                <a:solidFill>
-                  <a:schemeClr val="accent2">
-                    <a:satMod val="140000"/>
-                  </a:schemeClr>
-                </a:solidFill>
-                <a:prstDash val="solid"/>
-                <a:miter lim="800000"/>
-              </a:ln>
-              <a:noFill/>
-              <a:effectLst>
-                <a:outerShdw blurRad="25500" dist="23000" dir="7020000" algn="tl">
-                  <a:srgbClr val="000000">
-                    <a:alpha val="50000"/>
-                  </a:srgbClr>
-                </a:outerShdw>
-              </a:effectLst>
-            </a:endParaRPr>
-          </a:p>
-        </p:txBody>
-      </p:sp>
-      <p:sp>
-        <p:nvSpPr>
           <p:cNvPr id="10" name="Rectangle 9"/>
           <p:cNvSpPr/>
           <p:nvPr/>
         </p:nvSpPr>
         <p:spPr>
           <a:xfrm>
-            <a:off x="7922408" y="1455206"/>
-            <a:ext cx="262662" cy="276999"/>
+            <a:off x="7883410" y="1455206"/>
+            <a:ext cx="340658" cy="276999"/>
           </a:xfrm>
           <a:prstGeom prst="rect">
             <a:avLst/>
@@ -3436,7 +3446,7 @@
                   </a:outerShdw>
                 </a:effectLst>
               </a:rPr>
-              <a:t>5</a:t>
+              <a:t>10</a:t>
             </a:r>
             <a:endParaRPr lang="x-none" sz="1200" b="1" dirty="0">
               <a:ln w="18000">
@@ -3503,7 +3513,7 @@
                   </a:outerShdw>
                 </a:effectLst>
               </a:rPr>
-              <a:t>6</a:t>
+              <a:t>8</a:t>
             </a:r>
             <a:endParaRPr lang="x-none" sz="1200" b="1" dirty="0">
               <a:ln w="18000">
@@ -3535,8 +3545,8 @@
         </p:nvSpPr>
         <p:spPr>
           <a:xfrm>
-            <a:off x="1585182" y="1930174"/>
-            <a:ext cx="262662" cy="276999"/>
+            <a:off x="1546184" y="1930174"/>
+            <a:ext cx="340658" cy="276999"/>
           </a:xfrm>
           <a:prstGeom prst="rect">
             <a:avLst/>
@@ -3551,7 +3561,7 @@
           <a:p>
             <a:pPr algn="ctr"/>
             <a:r>
-              <a:rPr lang="x-none" sz="1200" b="1" dirty="0">
+              <a:rPr lang="x-none" sz="1200" b="1" dirty="0" smtClean="0">
                 <a:ln w="18000">
                   <a:solidFill>
                     <a:schemeClr val="accent2">
@@ -3570,7 +3580,7 @@
                   </a:outerShdw>
                 </a:effectLst>
               </a:rPr>
-              <a:t>7</a:t>
+              <a:t>11</a:t>
             </a:r>
             <a:endParaRPr lang="x-none" sz="1200" b="1" dirty="0">
               <a:ln w="18000">
@@ -3602,121 +3612,8 @@
         </p:nvSpPr>
         <p:spPr>
           <a:xfrm>
-            <a:off x="8418003" y="4852262"/>
-            <a:ext cx="262662" cy="276999"/>
-          </a:xfrm>
-          <a:prstGeom prst="rect">
-            <a:avLst/>
-          </a:prstGeom>
-          <a:noFill/>
-        </p:spPr>
-        <p:txBody>
-          <a:bodyPr wrap="none" lIns="91440" tIns="45720" rIns="91440" bIns="45720">
-            <a:spAutoFit/>
-          </a:bodyPr>
-          <a:lstStyle/>
-          <a:p>
-            <a:pPr algn="ctr"/>
-            <a:r>
-              <a:rPr lang="x-none" sz="1200" b="1" cap="all" dirty="0">
-                <a:ln w="9000" cmpd="sng">
-                  <a:solidFill>
-                    <a:schemeClr val="accent4">
-                      <a:shade val="50000"/>
-                      <a:satMod val="120000"/>
-                    </a:schemeClr>
-                  </a:solidFill>
-                  <a:prstDash val="solid"/>
-                </a:ln>
-                <a:gradFill>
-                  <a:gsLst>
-                    <a:gs pos="0">
-                      <a:schemeClr val="accent4">
-                        <a:shade val="20000"/>
-                        <a:satMod val="245000"/>
-                      </a:schemeClr>
-                    </a:gs>
-                    <a:gs pos="43000">
-                      <a:schemeClr val="accent4">
-                        <a:satMod val="255000"/>
-                      </a:schemeClr>
-                    </a:gs>
-                    <a:gs pos="48000">
-                      <a:schemeClr val="accent4">
-                        <a:shade val="85000"/>
-                        <a:satMod val="255000"/>
-                      </a:schemeClr>
-                    </a:gs>
-                    <a:gs pos="100000">
-                      <a:schemeClr val="accent4">
-                        <a:shade val="20000"/>
-                        <a:satMod val="245000"/>
-                      </a:schemeClr>
-                    </a:gs>
-                  </a:gsLst>
-                  <a:lin ang="5400000"/>
-                </a:gradFill>
-                <a:effectLst>
-                  <a:reflection blurRad="12700" stA="28000" endPos="45000" dist="1000" dir="5400000" sy="-100000" algn="bl" rotWithShape="0"/>
-                </a:effectLst>
-              </a:rPr>
-              <a:t>8</a:t>
-            </a:r>
-            <a:endParaRPr lang="x-none" sz="1200" b="1" cap="all" dirty="0">
-              <a:ln w="9000" cmpd="sng">
-                <a:solidFill>
-                  <a:schemeClr val="accent4">
-                    <a:shade val="50000"/>
-                    <a:satMod val="120000"/>
-                  </a:schemeClr>
-                </a:solidFill>
-                <a:prstDash val="solid"/>
-              </a:ln>
-              <a:gradFill>
-                <a:gsLst>
-                  <a:gs pos="0">
-                    <a:schemeClr val="accent4">
-                      <a:shade val="20000"/>
-                      <a:satMod val="245000"/>
-                    </a:schemeClr>
-                  </a:gs>
-                  <a:gs pos="43000">
-                    <a:schemeClr val="accent4">
-                      <a:satMod val="255000"/>
-                    </a:schemeClr>
-                  </a:gs>
-                  <a:gs pos="48000">
-                    <a:schemeClr val="accent4">
-                      <a:shade val="85000"/>
-                      <a:satMod val="255000"/>
-                    </a:schemeClr>
-                  </a:gs>
-                  <a:gs pos="100000">
-                    <a:schemeClr val="accent4">
-                      <a:shade val="20000"/>
-                      <a:satMod val="245000"/>
-                    </a:schemeClr>
-                  </a:gs>
-                </a:gsLst>
-                <a:lin ang="5400000"/>
-              </a:gradFill>
-              <a:effectLst>
-                <a:reflection blurRad="12700" stA="28000" endPos="45000" dist="1000" dir="5400000" sy="-100000" algn="bl" rotWithShape="0"/>
-              </a:effectLst>
-            </a:endParaRPr>
-          </a:p>
-        </p:txBody>
-      </p:sp>
-      <p:sp>
-        <p:nvSpPr>
-          <p:cNvPr id="14" name="Rectangle 13"/>
-          <p:cNvSpPr/>
-          <p:nvPr/>
-        </p:nvSpPr>
-        <p:spPr>
-          <a:xfrm>
-            <a:off x="651196" y="3533293"/>
-            <a:ext cx="262662" cy="276999"/>
+            <a:off x="8379005" y="4852262"/>
+            <a:ext cx="340658" cy="276999"/>
           </a:xfrm>
           <a:prstGeom prst="rect">
             <a:avLst/>
@@ -3773,7 +3670,7 @@
                   <a:reflection blurRad="12700" stA="28000" endPos="45000" dist="1000" dir="5400000" sy="-100000" algn="bl" rotWithShape="0"/>
                 </a:effectLst>
               </a:rPr>
-              <a:t>9</a:t>
+              <a:t>16</a:t>
             </a:r>
             <a:endParaRPr lang="x-none" sz="1200" b="1" cap="all" dirty="0">
               <a:ln w="9000" cmpd="sng">
@@ -3822,13 +3719,13 @@
       </p:sp>
       <p:sp>
         <p:nvSpPr>
-          <p:cNvPr id="15" name="Rectangle 14"/>
+          <p:cNvPr id="14" name="Rectangle 13"/>
           <p:cNvSpPr/>
           <p:nvPr/>
         </p:nvSpPr>
         <p:spPr>
           <a:xfrm>
-            <a:off x="999791" y="373516"/>
+            <a:off x="612198" y="3533293"/>
             <a:ext cx="340658" cy="276999"/>
           </a:xfrm>
           <a:prstGeom prst="rect">
@@ -3886,7 +3783,7 @@
                   <a:reflection blurRad="12700" stA="28000" endPos="45000" dist="1000" dir="5400000" sy="-100000" algn="bl" rotWithShape="0"/>
                 </a:effectLst>
               </a:rPr>
-              <a:t>10</a:t>
+              <a:t>13</a:t>
             </a:r>
             <a:endParaRPr lang="x-none" sz="1200" b="1" cap="all" dirty="0">
               <a:ln w="9000" cmpd="sng">
@@ -3935,14 +3832,14 @@
       </p:sp>
       <p:sp>
         <p:nvSpPr>
-          <p:cNvPr id="16" name="Rectangle 15"/>
+          <p:cNvPr id="15" name="Rectangle 14"/>
           <p:cNvSpPr/>
           <p:nvPr/>
         </p:nvSpPr>
         <p:spPr>
           <a:xfrm>
-            <a:off x="3596097" y="4821284"/>
-            <a:ext cx="340658" cy="276999"/>
+            <a:off x="1038789" y="373516"/>
+            <a:ext cx="262662" cy="276999"/>
           </a:xfrm>
           <a:prstGeom prst="rect">
             <a:avLst/>
@@ -3999,7 +3896,7 @@
                   <a:reflection blurRad="12700" stA="28000" endPos="45000" dist="1000" dir="5400000" sy="-100000" algn="bl" rotWithShape="0"/>
                 </a:effectLst>
               </a:rPr>
-              <a:t>13</a:t>
+              <a:t>9</a:t>
             </a:r>
             <a:endParaRPr lang="x-none" sz="1200" b="1" cap="all" dirty="0">
               <a:ln w="9000" cmpd="sng">
@@ -4048,214 +3945,13 @@
       </p:sp>
       <p:sp>
         <p:nvSpPr>
-          <p:cNvPr id="18" name="Rectangle 17"/>
+          <p:cNvPr id="16" name="Rectangle 15"/>
           <p:cNvSpPr/>
           <p:nvPr/>
         </p:nvSpPr>
         <p:spPr>
           <a:xfrm>
-            <a:off x="1326678" y="105294"/>
-            <a:ext cx="340658" cy="276999"/>
-          </a:xfrm>
-          <a:prstGeom prst="rect">
-            <a:avLst/>
-          </a:prstGeom>
-          <a:noFill/>
-        </p:spPr>
-        <p:txBody>
-          <a:bodyPr wrap="none" lIns="91440" tIns="45720" rIns="91440" bIns="45720">
-            <a:spAutoFit/>
-          </a:bodyPr>
-          <a:lstStyle/>
-          <a:p>
-            <a:pPr algn="ctr"/>
-            <a:r>
-              <a:rPr lang="x-none" sz="1200" b="1" dirty="0" smtClean="0">
-                <a:ln w="18000">
-                  <a:solidFill>
-                    <a:schemeClr val="accent2">
-                      <a:satMod val="140000"/>
-                    </a:schemeClr>
-                  </a:solidFill>
-                  <a:prstDash val="solid"/>
-                  <a:miter lim="800000"/>
-                </a:ln>
-                <a:noFill/>
-                <a:effectLst>
-                  <a:outerShdw blurRad="25500" dist="23000" dir="7020000" algn="tl">
-                    <a:srgbClr val="000000">
-                      <a:alpha val="50000"/>
-                    </a:srgbClr>
-                  </a:outerShdw>
-                </a:effectLst>
-              </a:rPr>
-              <a:t>11</a:t>
-            </a:r>
-            <a:endParaRPr lang="x-none" sz="1200" b="1" dirty="0">
-              <a:ln w="18000">
-                <a:solidFill>
-                  <a:schemeClr val="accent2">
-                    <a:satMod val="140000"/>
-                  </a:schemeClr>
-                </a:solidFill>
-                <a:prstDash val="solid"/>
-                <a:miter lim="800000"/>
-              </a:ln>
-              <a:noFill/>
-              <a:effectLst>
-                <a:outerShdw blurRad="25500" dist="23000" dir="7020000" algn="tl">
-                  <a:srgbClr val="000000">
-                    <a:alpha val="50000"/>
-                  </a:srgbClr>
-                </a:outerShdw>
-              </a:effectLst>
-            </a:endParaRPr>
-          </a:p>
-        </p:txBody>
-      </p:sp>
-      <p:sp>
-        <p:nvSpPr>
-          <p:cNvPr id="19" name="Rectangle 18"/>
-          <p:cNvSpPr/>
-          <p:nvPr/>
-        </p:nvSpPr>
-        <p:spPr>
-          <a:xfrm>
-            <a:off x="191774" y="0"/>
-            <a:ext cx="340658" cy="276999"/>
-          </a:xfrm>
-          <a:prstGeom prst="rect">
-            <a:avLst/>
-          </a:prstGeom>
-          <a:noFill/>
-        </p:spPr>
-        <p:txBody>
-          <a:bodyPr wrap="none" lIns="91440" tIns="45720" rIns="91440" bIns="45720">
-            <a:spAutoFit/>
-          </a:bodyPr>
-          <a:lstStyle/>
-          <a:p>
-            <a:pPr algn="ctr"/>
-            <a:r>
-              <a:rPr lang="x-none" sz="1200" b="1" dirty="0" smtClean="0">
-                <a:ln w="18000">
-                  <a:solidFill>
-                    <a:schemeClr val="accent2">
-                      <a:satMod val="140000"/>
-                    </a:schemeClr>
-                  </a:solidFill>
-                  <a:prstDash val="solid"/>
-                  <a:miter lim="800000"/>
-                </a:ln>
-                <a:noFill/>
-                <a:effectLst>
-                  <a:outerShdw blurRad="25500" dist="23000" dir="7020000" algn="tl">
-                    <a:srgbClr val="000000">
-                      <a:alpha val="50000"/>
-                    </a:srgbClr>
-                  </a:outerShdw>
-                </a:effectLst>
-              </a:rPr>
-              <a:t>12</a:t>
-            </a:r>
-            <a:endParaRPr lang="x-none" sz="1200" b="1" dirty="0">
-              <a:ln w="18000">
-                <a:solidFill>
-                  <a:schemeClr val="accent2">
-                    <a:satMod val="140000"/>
-                  </a:schemeClr>
-                </a:solidFill>
-                <a:prstDash val="solid"/>
-                <a:miter lim="800000"/>
-              </a:ln>
-              <a:noFill/>
-              <a:effectLst>
-                <a:outerShdw blurRad="25500" dist="23000" dir="7020000" algn="tl">
-                  <a:srgbClr val="000000">
-                    <a:alpha val="50000"/>
-                  </a:srgbClr>
-                </a:outerShdw>
-              </a:effectLst>
-            </a:endParaRPr>
-          </a:p>
-        </p:txBody>
-      </p:sp>
-      <p:sp>
-        <p:nvSpPr>
-          <p:cNvPr id="20" name="Rectangle 19"/>
-          <p:cNvSpPr/>
-          <p:nvPr/>
-        </p:nvSpPr>
-        <p:spPr>
-          <a:xfrm>
-            <a:off x="1242388" y="244672"/>
-            <a:ext cx="340658" cy="276999"/>
-          </a:xfrm>
-          <a:prstGeom prst="rect">
-            <a:avLst/>
-          </a:prstGeom>
-          <a:noFill/>
-        </p:spPr>
-        <p:txBody>
-          <a:bodyPr wrap="none" lIns="91440" tIns="45720" rIns="91440" bIns="45720">
-            <a:spAutoFit/>
-          </a:bodyPr>
-          <a:lstStyle/>
-          <a:p>
-            <a:pPr algn="ctr"/>
-            <a:r>
-              <a:rPr lang="x-none" sz="1200" b="1" dirty="0" smtClean="0">
-                <a:ln w="18000">
-                  <a:solidFill>
-                    <a:schemeClr val="accent2">
-                      <a:satMod val="140000"/>
-                    </a:schemeClr>
-                  </a:solidFill>
-                  <a:prstDash val="solid"/>
-                  <a:miter lim="800000"/>
-                </a:ln>
-                <a:noFill/>
-                <a:effectLst>
-                  <a:outerShdw blurRad="25500" dist="23000" dir="7020000" algn="tl">
-                    <a:srgbClr val="000000">
-                      <a:alpha val="50000"/>
-                    </a:srgbClr>
-                  </a:outerShdw>
-                </a:effectLst>
-              </a:rPr>
-              <a:t>14</a:t>
-            </a:r>
-            <a:endParaRPr lang="x-none" sz="1200" b="1" dirty="0">
-              <a:ln w="18000">
-                <a:solidFill>
-                  <a:schemeClr val="accent2">
-                    <a:satMod val="140000"/>
-                  </a:schemeClr>
-                </a:solidFill>
-                <a:prstDash val="solid"/>
-                <a:miter lim="800000"/>
-              </a:ln>
-              <a:noFill/>
-              <a:effectLst>
-                <a:outerShdw blurRad="25500" dist="23000" dir="7020000" algn="tl">
-                  <a:srgbClr val="000000">
-                    <a:alpha val="50000"/>
-                  </a:srgbClr>
-                </a:outerShdw>
-              </a:effectLst>
-            </a:endParaRPr>
-          </a:p>
-        </p:txBody>
-      </p:sp>
-      <p:sp>
-        <p:nvSpPr>
-          <p:cNvPr id="21" name="Rectangle 20"/>
-          <p:cNvSpPr/>
-          <p:nvPr/>
-        </p:nvSpPr>
-        <p:spPr>
-          <a:xfrm>
-            <a:off x="4373154" y="5802400"/>
+            <a:off x="3596097" y="4821284"/>
             <a:ext cx="340658" cy="276999"/>
           </a:xfrm>
           <a:prstGeom prst="rect">
@@ -4313,7 +4009,7 @@
                   <a:reflection blurRad="12700" stA="28000" endPos="45000" dist="1000" dir="5400000" sy="-100000" algn="bl" rotWithShape="0"/>
                 </a:effectLst>
               </a:rPr>
-              <a:t>16</a:t>
+              <a:t>15</a:t>
             </a:r>
             <a:endParaRPr lang="x-none" sz="1200" b="1" cap="all" dirty="0">
               <a:ln w="9000" cmpd="sng">
@@ -4362,13 +4058,214 @@
       </p:sp>
       <p:sp>
         <p:nvSpPr>
-          <p:cNvPr id="22" name="Rectangle 21"/>
+          <p:cNvPr id="18" name="Rectangle 17"/>
           <p:cNvSpPr/>
           <p:nvPr/>
         </p:nvSpPr>
         <p:spPr>
           <a:xfrm>
-            <a:off x="7924924" y="106172"/>
+            <a:off x="735342" y="105294"/>
+            <a:ext cx="262662" cy="276999"/>
+          </a:xfrm>
+          <a:prstGeom prst="rect">
+            <a:avLst/>
+          </a:prstGeom>
+          <a:noFill/>
+        </p:spPr>
+        <p:txBody>
+          <a:bodyPr wrap="none" lIns="91440" tIns="45720" rIns="91440" bIns="45720">
+            <a:spAutoFit/>
+          </a:bodyPr>
+          <a:lstStyle/>
+          <a:p>
+            <a:pPr algn="ctr"/>
+            <a:r>
+              <a:rPr lang="x-none" sz="1200" b="1" dirty="0" smtClean="0">
+                <a:ln w="18000">
+                  <a:solidFill>
+                    <a:schemeClr val="accent2">
+                      <a:satMod val="140000"/>
+                    </a:schemeClr>
+                  </a:solidFill>
+                  <a:prstDash val="solid"/>
+                  <a:miter lim="800000"/>
+                </a:ln>
+                <a:noFill/>
+                <a:effectLst>
+                  <a:outerShdw blurRad="25500" dist="23000" dir="7020000" algn="tl">
+                    <a:srgbClr val="000000">
+                      <a:alpha val="50000"/>
+                    </a:srgbClr>
+                  </a:outerShdw>
+                </a:effectLst>
+              </a:rPr>
+              <a:t>3</a:t>
+            </a:r>
+            <a:endParaRPr lang="x-none" sz="1200" b="1" dirty="0">
+              <a:ln w="18000">
+                <a:solidFill>
+                  <a:schemeClr val="accent2">
+                    <a:satMod val="140000"/>
+                  </a:schemeClr>
+                </a:solidFill>
+                <a:prstDash val="solid"/>
+                <a:miter lim="800000"/>
+              </a:ln>
+              <a:noFill/>
+              <a:effectLst>
+                <a:outerShdw blurRad="25500" dist="23000" dir="7020000" algn="tl">
+                  <a:srgbClr val="000000">
+                    <a:alpha val="50000"/>
+                  </a:srgbClr>
+                </a:outerShdw>
+              </a:effectLst>
+            </a:endParaRPr>
+          </a:p>
+        </p:txBody>
+      </p:sp>
+      <p:sp>
+        <p:nvSpPr>
+          <p:cNvPr id="19" name="Rectangle 18"/>
+          <p:cNvSpPr/>
+          <p:nvPr/>
+        </p:nvSpPr>
+        <p:spPr>
+          <a:xfrm>
+            <a:off x="153342" y="-10326"/>
+            <a:ext cx="262662" cy="276999"/>
+          </a:xfrm>
+          <a:prstGeom prst="rect">
+            <a:avLst/>
+          </a:prstGeom>
+          <a:noFill/>
+        </p:spPr>
+        <p:txBody>
+          <a:bodyPr wrap="none" lIns="91440" tIns="45720" rIns="91440" bIns="45720">
+            <a:spAutoFit/>
+          </a:bodyPr>
+          <a:lstStyle/>
+          <a:p>
+            <a:pPr algn="ctr"/>
+            <a:r>
+              <a:rPr lang="x-none" sz="1200" b="1" dirty="0" smtClean="0">
+                <a:ln w="18000">
+                  <a:solidFill>
+                    <a:schemeClr val="accent2">
+                      <a:satMod val="140000"/>
+                    </a:schemeClr>
+                  </a:solidFill>
+                  <a:prstDash val="solid"/>
+                  <a:miter lim="800000"/>
+                </a:ln>
+                <a:noFill/>
+                <a:effectLst>
+                  <a:outerShdw blurRad="25500" dist="23000" dir="7020000" algn="tl">
+                    <a:srgbClr val="000000">
+                      <a:alpha val="50000"/>
+                    </a:srgbClr>
+                  </a:outerShdw>
+                </a:effectLst>
+              </a:rPr>
+              <a:t>2</a:t>
+            </a:r>
+            <a:endParaRPr lang="x-none" sz="1200" b="1" dirty="0">
+              <a:ln w="18000">
+                <a:solidFill>
+                  <a:schemeClr val="accent2">
+                    <a:satMod val="140000"/>
+                  </a:schemeClr>
+                </a:solidFill>
+                <a:prstDash val="solid"/>
+                <a:miter lim="800000"/>
+              </a:ln>
+              <a:noFill/>
+              <a:effectLst>
+                <a:outerShdw blurRad="25500" dist="23000" dir="7020000" algn="tl">
+                  <a:srgbClr val="000000">
+                    <a:alpha val="50000"/>
+                  </a:srgbClr>
+                </a:outerShdw>
+              </a:effectLst>
+            </a:endParaRPr>
+          </a:p>
+        </p:txBody>
+      </p:sp>
+      <p:sp>
+        <p:nvSpPr>
+          <p:cNvPr id="20" name="Rectangle 19"/>
+          <p:cNvSpPr/>
+          <p:nvPr/>
+        </p:nvSpPr>
+        <p:spPr>
+          <a:xfrm>
+            <a:off x="1281386" y="244672"/>
+            <a:ext cx="262662" cy="276999"/>
+          </a:xfrm>
+          <a:prstGeom prst="rect">
+            <a:avLst/>
+          </a:prstGeom>
+          <a:noFill/>
+        </p:spPr>
+        <p:txBody>
+          <a:bodyPr wrap="none" lIns="91440" tIns="45720" rIns="91440" bIns="45720">
+            <a:spAutoFit/>
+          </a:bodyPr>
+          <a:lstStyle/>
+          <a:p>
+            <a:pPr algn="ctr"/>
+            <a:r>
+              <a:rPr lang="x-none" sz="1200" b="1" dirty="0" smtClean="0">
+                <a:ln w="18000">
+                  <a:solidFill>
+                    <a:schemeClr val="accent2">
+                      <a:satMod val="140000"/>
+                    </a:schemeClr>
+                  </a:solidFill>
+                  <a:prstDash val="solid"/>
+                  <a:miter lim="800000"/>
+                </a:ln>
+                <a:noFill/>
+                <a:effectLst>
+                  <a:outerShdw blurRad="25500" dist="23000" dir="7020000" algn="tl">
+                    <a:srgbClr val="000000">
+                      <a:alpha val="50000"/>
+                    </a:srgbClr>
+                  </a:outerShdw>
+                </a:effectLst>
+              </a:rPr>
+              <a:t>6</a:t>
+            </a:r>
+            <a:endParaRPr lang="x-none" sz="1200" b="1" dirty="0">
+              <a:ln w="18000">
+                <a:solidFill>
+                  <a:schemeClr val="accent2">
+                    <a:satMod val="140000"/>
+                  </a:schemeClr>
+                </a:solidFill>
+                <a:prstDash val="solid"/>
+                <a:miter lim="800000"/>
+              </a:ln>
+              <a:noFill/>
+              <a:effectLst>
+                <a:outerShdw blurRad="25500" dist="23000" dir="7020000" algn="tl">
+                  <a:srgbClr val="000000">
+                    <a:alpha val="50000"/>
+                  </a:srgbClr>
+                </a:outerShdw>
+              </a:effectLst>
+            </a:endParaRPr>
+          </a:p>
+        </p:txBody>
+      </p:sp>
+      <p:sp>
+        <p:nvSpPr>
+          <p:cNvPr id="21" name="Rectangle 20"/>
+          <p:cNvSpPr/>
+          <p:nvPr/>
+        </p:nvSpPr>
+        <p:spPr>
+          <a:xfrm>
+            <a:off x="4373154" y="5802400"/>
             <a:ext cx="340658" cy="276999"/>
           </a:xfrm>
           <a:prstGeom prst="rect">
@@ -4426,7 +4323,7 @@
                   <a:reflection blurRad="12700" stA="28000" endPos="45000" dist="1000" dir="5400000" sy="-100000" algn="bl" rotWithShape="0"/>
                 </a:effectLst>
               </a:rPr>
-              <a:t>15</a:t>
+              <a:t>17</a:t>
             </a:r>
             <a:endParaRPr lang="x-none" sz="1200" b="1" cap="all" dirty="0">
               <a:ln w="9000" cmpd="sng">
@@ -4475,14 +4372,14 @@
       </p:sp>
       <p:sp>
         <p:nvSpPr>
-          <p:cNvPr id="23" name="TextBox 22"/>
-          <p:cNvSpPr txBox="1"/>
+          <p:cNvPr id="22" name="Rectangle 21"/>
+          <p:cNvSpPr/>
           <p:nvPr/>
         </p:nvSpPr>
         <p:spPr>
           <a:xfrm>
-            <a:off x="5162456" y="562733"/>
-            <a:ext cx="1641661" cy="3416319"/>
+            <a:off x="7963922" y="106172"/>
+            <a:ext cx="262662" cy="276999"/>
           </a:xfrm>
           <a:prstGeom prst="rect">
             <a:avLst/>
@@ -4490,105 +4387,693 @@
           <a:noFill/>
         </p:spPr>
         <p:txBody>
+          <a:bodyPr wrap="none" lIns="91440" tIns="45720" rIns="91440" bIns="45720">
+            <a:spAutoFit/>
+          </a:bodyPr>
+          <a:lstStyle/>
+          <a:p>
+            <a:pPr algn="ctr"/>
+            <a:r>
+              <a:rPr lang="x-none" sz="1200" b="1" cap="all" dirty="0" smtClean="0">
+                <a:ln w="9000" cmpd="sng">
+                  <a:solidFill>
+                    <a:schemeClr val="accent4">
+                      <a:shade val="50000"/>
+                      <a:satMod val="120000"/>
+                    </a:schemeClr>
+                  </a:solidFill>
+                  <a:prstDash val="solid"/>
+                </a:ln>
+                <a:gradFill>
+                  <a:gsLst>
+                    <a:gs pos="0">
+                      <a:schemeClr val="accent4">
+                        <a:shade val="20000"/>
+                        <a:satMod val="245000"/>
+                      </a:schemeClr>
+                    </a:gs>
+                    <a:gs pos="43000">
+                      <a:schemeClr val="accent4">
+                        <a:satMod val="255000"/>
+                      </a:schemeClr>
+                    </a:gs>
+                    <a:gs pos="48000">
+                      <a:schemeClr val="accent4">
+                        <a:shade val="85000"/>
+                        <a:satMod val="255000"/>
+                      </a:schemeClr>
+                    </a:gs>
+                    <a:gs pos="100000">
+                      <a:schemeClr val="accent4">
+                        <a:shade val="20000"/>
+                        <a:satMod val="245000"/>
+                      </a:schemeClr>
+                    </a:gs>
+                  </a:gsLst>
+                  <a:lin ang="5400000"/>
+                </a:gradFill>
+                <a:effectLst>
+                  <a:reflection blurRad="12700" stA="28000" endPos="45000" dist="1000" dir="5400000" sy="-100000" algn="bl" rotWithShape="0"/>
+                </a:effectLst>
+              </a:rPr>
+              <a:t>5</a:t>
+            </a:r>
+            <a:endParaRPr lang="x-none" sz="1200" b="1" cap="all" dirty="0">
+              <a:ln w="9000" cmpd="sng">
+                <a:solidFill>
+                  <a:schemeClr val="accent4">
+                    <a:shade val="50000"/>
+                    <a:satMod val="120000"/>
+                  </a:schemeClr>
+                </a:solidFill>
+                <a:prstDash val="solid"/>
+              </a:ln>
+              <a:gradFill>
+                <a:gsLst>
+                  <a:gs pos="0">
+                    <a:schemeClr val="accent4">
+                      <a:shade val="20000"/>
+                      <a:satMod val="245000"/>
+                    </a:schemeClr>
+                  </a:gs>
+                  <a:gs pos="43000">
+                    <a:schemeClr val="accent4">
+                      <a:satMod val="255000"/>
+                    </a:schemeClr>
+                  </a:gs>
+                  <a:gs pos="48000">
+                    <a:schemeClr val="accent4">
+                      <a:shade val="85000"/>
+                      <a:satMod val="255000"/>
+                    </a:schemeClr>
+                  </a:gs>
+                  <a:gs pos="100000">
+                    <a:schemeClr val="accent4">
+                      <a:shade val="20000"/>
+                      <a:satMod val="245000"/>
+                    </a:schemeClr>
+                  </a:gs>
+                </a:gsLst>
+                <a:lin ang="5400000"/>
+              </a:gradFill>
+              <a:effectLst>
+                <a:reflection blurRad="12700" stA="28000" endPos="45000" dist="1000" dir="5400000" sy="-100000" algn="bl" rotWithShape="0"/>
+              </a:effectLst>
+            </a:endParaRPr>
+          </a:p>
+        </p:txBody>
+      </p:sp>
+      <p:sp>
+        <p:nvSpPr>
+          <p:cNvPr id="23" name="TextBox 22"/>
+          <p:cNvSpPr txBox="1"/>
+          <p:nvPr/>
+        </p:nvSpPr>
+        <p:spPr>
+          <a:xfrm>
+            <a:off x="4790759" y="650515"/>
+            <a:ext cx="2297293" cy="3847207"/>
+          </a:xfrm>
+          <a:prstGeom prst="rect">
+            <a:avLst/>
+          </a:prstGeom>
+          <a:noFill/>
+          <a:ln>
+            <a:solidFill>
+              <a:srgbClr val="FF0000"/>
+            </a:solidFill>
+          </a:ln>
+        </p:spPr>
+        <p:txBody>
           <a:bodyPr wrap="square" rtlCol="0">
             <a:spAutoFit/>
           </a:bodyPr>
           <a:lstStyle/>
           <a:p>
             <a:r>
-              <a:rPr lang="en-US" sz="1200" dirty="0" smtClean="0"/>
-              <a:t>1.</a:t>
-            </a:r>
-          </a:p>
-          <a:p>
-            <a:r>
-              <a:rPr lang="en-US" sz="1200" dirty="0" smtClean="0"/>
-              <a:t>2.</a:t>
-            </a:r>
-          </a:p>
-          <a:p>
-            <a:r>
-              <a:rPr lang="en-US" sz="1200" dirty="0" smtClean="0"/>
-              <a:t>3.</a:t>
-            </a:r>
-          </a:p>
-          <a:p>
-            <a:r>
-              <a:rPr lang="en-US" sz="1200" dirty="0" smtClean="0"/>
-              <a:t>4.</a:t>
-            </a:r>
-          </a:p>
-          <a:p>
-            <a:r>
-              <a:rPr lang="en-US" sz="1200" dirty="0" smtClean="0"/>
+              <a:rPr lang="en-US" sz="1000" dirty="0" smtClean="0"/>
+              <a:t>Numbers go </a:t>
+            </a:r>
+          </a:p>
+          <a:p>
+            <a:r>
+              <a:rPr lang="en-US" sz="1000" dirty="0" smtClean="0"/>
+              <a:t>(top-&gt; bottom, left -&gt; right)</a:t>
+            </a:r>
+          </a:p>
+          <a:p>
+            <a:r>
+              <a:rPr lang="en-US" sz="1000" b="1" dirty="0" smtClean="0">
+                <a:solidFill>
+                  <a:srgbClr val="FF0000"/>
+                </a:solidFill>
+              </a:rPr>
+              <a:t>1</a:t>
+            </a:r>
+            <a:r>
+              <a:rPr lang="en-US" sz="1000" b="1" dirty="0">
+                <a:solidFill>
+                  <a:srgbClr val="FF0000"/>
+                </a:solidFill>
+              </a:rPr>
+              <a:t>.</a:t>
+            </a:r>
+            <a:r>
+              <a:rPr lang="en-US" sz="1000" dirty="0">
+                <a:solidFill>
+                  <a:srgbClr val="FF0000"/>
+                </a:solidFill>
+              </a:rPr>
+              <a:t> </a:t>
+            </a:r>
+            <a:r>
+              <a:rPr lang="en-US" sz="1000" dirty="0"/>
+              <a:t>Menu </a:t>
+            </a:r>
+            <a:r>
+              <a:rPr lang="en-US" sz="1000" dirty="0" smtClean="0"/>
+              <a:t>bar &gt; Navigate</a:t>
+            </a:r>
+            <a:endParaRPr lang="en-US" sz="1000" dirty="0" smtClean="0"/>
+          </a:p>
+          <a:p>
+            <a:r>
+              <a:rPr lang="en-US" sz="1000" b="1" dirty="0" smtClean="0">
+                <a:solidFill>
+                  <a:srgbClr val="FF0000"/>
+                </a:solidFill>
+              </a:rPr>
+              <a:t>2</a:t>
+            </a:r>
+            <a:r>
+              <a:rPr lang="en-US" sz="1000" b="1" dirty="0" smtClean="0">
+                <a:solidFill>
+                  <a:srgbClr val="FF0000"/>
+                </a:solidFill>
+              </a:rPr>
+              <a:t>.</a:t>
+            </a:r>
+            <a:r>
+              <a:rPr lang="en-US" sz="1000" dirty="0" smtClean="0">
+                <a:solidFill>
+                  <a:srgbClr val="FF0000"/>
+                </a:solidFill>
+              </a:rPr>
+              <a:t> </a:t>
+            </a:r>
+            <a:r>
+              <a:rPr lang="en-US" sz="1000" dirty="0"/>
+              <a:t>Windows Buttons &gt; Maximize</a:t>
+            </a:r>
+          </a:p>
+          <a:p>
+            <a:r>
+              <a:rPr lang="en-US" sz="1000" b="1" dirty="0" smtClean="0">
+                <a:solidFill>
+                  <a:srgbClr val="FF0000"/>
+                </a:solidFill>
+              </a:rPr>
+              <a:t>3</a:t>
+            </a:r>
+            <a:r>
+              <a:rPr lang="en-US" sz="1000" b="1" dirty="0" smtClean="0">
+                <a:solidFill>
+                  <a:srgbClr val="FF0000"/>
+                </a:solidFill>
+              </a:rPr>
+              <a:t>.</a:t>
+            </a:r>
+            <a:r>
+              <a:rPr lang="en-US" sz="1000" dirty="0" smtClean="0">
+                <a:solidFill>
+                  <a:srgbClr val="FF0000"/>
+                </a:solidFill>
+              </a:rPr>
+              <a:t> </a:t>
+            </a:r>
+            <a:r>
+              <a:rPr lang="en-US" sz="1000" dirty="0"/>
+              <a:t>Tool Bar &gt; Run Button</a:t>
+            </a:r>
+          </a:p>
+          <a:p>
+            <a:r>
+              <a:rPr lang="en-US" sz="1000" b="1" dirty="0" smtClean="0">
+                <a:solidFill>
+                  <a:srgbClr val="FF0000"/>
+                </a:solidFill>
+              </a:rPr>
+              <a:t>4</a:t>
+            </a:r>
+            <a:r>
+              <a:rPr lang="en-US" sz="1000" b="1" dirty="0" smtClean="0">
+                <a:solidFill>
+                  <a:srgbClr val="FF0000"/>
+                </a:solidFill>
+              </a:rPr>
+              <a:t>.</a:t>
+            </a:r>
+            <a:r>
+              <a:rPr lang="en-US" sz="1000" dirty="0" smtClean="0">
+                <a:solidFill>
+                  <a:srgbClr val="FF0000"/>
+                </a:solidFill>
+              </a:rPr>
+              <a:t> </a:t>
+            </a:r>
+            <a:r>
+              <a:rPr lang="en-US" sz="1000" dirty="0"/>
+              <a:t>Tool Bar &gt; Back Button &gt; Drop Down Menu</a:t>
+            </a:r>
+          </a:p>
+          <a:p>
+            <a:r>
+              <a:rPr lang="en-US" sz="1000" b="1" dirty="0">
+                <a:solidFill>
+                  <a:srgbClr val="7933CE"/>
+                </a:solidFill>
+              </a:rPr>
               <a:t>5.</a:t>
             </a:r>
-          </a:p>
-          <a:p>
-            <a:r>
-              <a:rPr lang="en-US" sz="1200" dirty="0" smtClean="0"/>
-              <a:t>6.</a:t>
-            </a:r>
-          </a:p>
-          <a:p>
-            <a:r>
-              <a:rPr lang="en-US" sz="1200" dirty="0" smtClean="0"/>
-              <a:t>7.</a:t>
-            </a:r>
-          </a:p>
-          <a:p>
-            <a:r>
-              <a:rPr lang="en-US" sz="1200" dirty="0" smtClean="0"/>
-              <a:t>8.</a:t>
-            </a:r>
-          </a:p>
-          <a:p>
-            <a:r>
-              <a:rPr lang="en-US" sz="1200" dirty="0" smtClean="0"/>
+            <a:r>
+              <a:rPr lang="en-US" sz="1000" dirty="0">
+                <a:solidFill>
+                  <a:srgbClr val="7933CE"/>
+                </a:solidFill>
+              </a:rPr>
+              <a:t> </a:t>
+            </a:r>
+            <a:r>
+              <a:rPr lang="en-US" sz="1000" dirty="0"/>
+              <a:t>Tool Bar &gt; Left Side &gt; Quick Access</a:t>
+            </a:r>
+          </a:p>
+          <a:p>
+            <a:r>
+              <a:rPr lang="en-US" sz="1000" b="1" dirty="0" smtClean="0">
+                <a:solidFill>
+                  <a:srgbClr val="FF0000"/>
+                </a:solidFill>
+              </a:rPr>
+              <a:t>6</a:t>
+            </a:r>
+            <a:r>
+              <a:rPr lang="en-US" sz="1000" b="1" dirty="0" smtClean="0">
+                <a:solidFill>
+                  <a:srgbClr val="FF0000"/>
+                </a:solidFill>
+              </a:rPr>
+              <a:t>.</a:t>
+            </a:r>
+            <a:r>
+              <a:rPr lang="en-US" sz="1000" dirty="0" smtClean="0">
+                <a:solidFill>
+                  <a:srgbClr val="FF0000"/>
+                </a:solidFill>
+              </a:rPr>
+              <a:t> </a:t>
+            </a:r>
+            <a:r>
+              <a:rPr lang="en-US" sz="1000" dirty="0"/>
+              <a:t>Left </a:t>
+            </a:r>
+            <a:r>
+              <a:rPr lang="en-US" sz="1000" dirty="0" err="1"/>
+              <a:t>Tabwell</a:t>
+            </a:r>
+            <a:r>
+              <a:rPr lang="en-US" sz="1000" dirty="0"/>
+              <a:t> &gt; Window Buttons </a:t>
+            </a:r>
+          </a:p>
+          <a:p>
+            <a:r>
+              <a:rPr lang="en-US" sz="1000" b="1" dirty="0" smtClean="0">
+                <a:solidFill>
+                  <a:srgbClr val="FF0000"/>
+                </a:solidFill>
+              </a:rPr>
+              <a:t>7</a:t>
+            </a:r>
+            <a:r>
+              <a:rPr lang="en-US" sz="1000" b="1" dirty="0" smtClean="0">
+                <a:solidFill>
+                  <a:srgbClr val="FF0000"/>
+                </a:solidFill>
+              </a:rPr>
+              <a:t>.</a:t>
+            </a:r>
+            <a:r>
+              <a:rPr lang="en-US" sz="1000" dirty="0" smtClean="0">
+                <a:solidFill>
+                  <a:srgbClr val="FF0000"/>
+                </a:solidFill>
+              </a:rPr>
+              <a:t> </a:t>
+            </a:r>
+            <a:r>
+              <a:rPr lang="en-US" sz="1000" dirty="0"/>
+              <a:t>Main Window &gt; 2nd Tab</a:t>
+            </a:r>
+          </a:p>
+          <a:p>
+            <a:r>
+              <a:rPr lang="en-US" sz="1000" b="1" dirty="0" smtClean="0">
+                <a:solidFill>
+                  <a:srgbClr val="FF0000"/>
+                </a:solidFill>
+              </a:rPr>
+              <a:t>8</a:t>
+            </a:r>
+            <a:r>
+              <a:rPr lang="en-US" sz="1000" b="1" dirty="0" smtClean="0">
+                <a:solidFill>
+                  <a:srgbClr val="FF0000"/>
+                </a:solidFill>
+              </a:rPr>
+              <a:t>.</a:t>
+            </a:r>
+            <a:r>
+              <a:rPr lang="en-US" sz="1000" dirty="0" smtClean="0">
+                <a:solidFill>
+                  <a:srgbClr val="FF0000"/>
+                </a:solidFill>
+              </a:rPr>
+              <a:t> </a:t>
+            </a:r>
+            <a:r>
+              <a:rPr lang="en-US" sz="1000" dirty="0"/>
+              <a:t>Right </a:t>
+            </a:r>
+            <a:r>
+              <a:rPr lang="en-US" sz="1000" dirty="0" err="1"/>
+              <a:t>Tabwell</a:t>
+            </a:r>
+            <a:r>
+              <a:rPr lang="en-US" sz="1000" dirty="0"/>
+              <a:t> </a:t>
+            </a:r>
+            <a:r>
+              <a:rPr lang="en-US" sz="1000" dirty="0"/>
+              <a:t>&gt; Toolbar &gt; minimize all</a:t>
+            </a:r>
+          </a:p>
+          <a:p>
+            <a:r>
+              <a:rPr lang="en-US" sz="1000" b="1" dirty="0">
+                <a:solidFill>
+                  <a:srgbClr val="7933CE"/>
+                </a:solidFill>
+              </a:rPr>
               <a:t>9.</a:t>
             </a:r>
-          </a:p>
-          <a:p>
-            <a:r>
-              <a:rPr lang="en-US" sz="1200" dirty="0" smtClean="0"/>
-              <a:t>10.</a:t>
-            </a:r>
-          </a:p>
-          <a:p>
-            <a:r>
-              <a:rPr lang="en-US" sz="1200" dirty="0" smtClean="0"/>
-              <a:t>11.</a:t>
-            </a:r>
-          </a:p>
-          <a:p>
-            <a:r>
-              <a:rPr lang="en-US" sz="1200" dirty="0" smtClean="0"/>
-              <a:t>12.</a:t>
-            </a:r>
-          </a:p>
-          <a:p>
-            <a:r>
-              <a:rPr lang="en-US" sz="1200" dirty="0" smtClean="0"/>
+            <a:r>
+              <a:rPr lang="en-US" sz="1000" dirty="0">
+                <a:solidFill>
+                  <a:srgbClr val="7933CE"/>
+                </a:solidFill>
+              </a:rPr>
+              <a:t> </a:t>
+            </a:r>
+            <a:r>
+              <a:rPr lang="en-US" sz="1000" dirty="0"/>
+              <a:t>Left </a:t>
+            </a:r>
+            <a:r>
+              <a:rPr lang="en-US" sz="1000" dirty="0" err="1"/>
+              <a:t>Tabwell</a:t>
+            </a:r>
+            <a:r>
+              <a:rPr lang="en-US" sz="1000" dirty="0"/>
+              <a:t> &gt; Toolbar &gt; minimize all</a:t>
+            </a:r>
+          </a:p>
+          <a:p>
+            <a:r>
+              <a:rPr lang="en-US" sz="1000" b="1" dirty="0" smtClean="0">
+                <a:solidFill>
+                  <a:srgbClr val="FF0000"/>
+                </a:solidFill>
+              </a:rPr>
+              <a:t>10</a:t>
+            </a:r>
+            <a:r>
+              <a:rPr lang="en-US" sz="1000" b="1" dirty="0" smtClean="0">
+                <a:solidFill>
+                  <a:srgbClr val="FF0000"/>
+                </a:solidFill>
+              </a:rPr>
+              <a:t>. </a:t>
+            </a:r>
+            <a:r>
+              <a:rPr lang="en-US" sz="1000" dirty="0"/>
+              <a:t>Outline Tab &gt; </a:t>
+            </a:r>
+            <a:r>
+              <a:rPr lang="en-US" sz="1000" dirty="0" smtClean="0"/>
+              <a:t>Right </a:t>
+            </a:r>
+            <a:r>
+              <a:rPr lang="en-US" sz="1000" dirty="0" err="1" smtClean="0"/>
+              <a:t>Tabwell</a:t>
+            </a:r>
+            <a:r>
+              <a:rPr lang="en-US" sz="1000" b="1" dirty="0" smtClean="0">
+                <a:solidFill>
+                  <a:srgbClr val="FF0000"/>
+                </a:solidFill>
+              </a:rPr>
+              <a:t> </a:t>
+            </a:r>
+            <a:endParaRPr lang="en-US" sz="1000" b="1" dirty="0" smtClean="0">
+              <a:solidFill>
+                <a:srgbClr val="FF0000"/>
+              </a:solidFill>
+            </a:endParaRPr>
+          </a:p>
+          <a:p>
+            <a:r>
+              <a:rPr lang="en-US" sz="1000" b="1" dirty="0" smtClean="0">
+                <a:solidFill>
+                  <a:srgbClr val="FF0000"/>
+                </a:solidFill>
+              </a:rPr>
+              <a:t>11</a:t>
+            </a:r>
+            <a:r>
+              <a:rPr lang="en-US" sz="1000" b="1" dirty="0" smtClean="0">
+                <a:solidFill>
+                  <a:srgbClr val="FF0000"/>
+                </a:solidFill>
+              </a:rPr>
+              <a:t>. </a:t>
+            </a:r>
+            <a:r>
+              <a:rPr lang="en-US" sz="1000" dirty="0"/>
+              <a:t>Main Window &gt; Gutter</a:t>
+            </a:r>
+          </a:p>
+          <a:p>
+            <a:r>
+              <a:rPr lang="en-US" sz="1000" b="1" dirty="0" smtClean="0">
+                <a:solidFill>
+                  <a:srgbClr val="FF0000"/>
+                </a:solidFill>
+              </a:rPr>
+              <a:t>12</a:t>
+            </a:r>
+            <a:r>
+              <a:rPr lang="en-US" sz="1000" b="1" dirty="0" smtClean="0">
+                <a:solidFill>
+                  <a:srgbClr val="FF0000"/>
+                </a:solidFill>
+              </a:rPr>
+              <a:t>. </a:t>
+            </a:r>
+            <a:r>
+              <a:rPr lang="en-US" sz="1000" dirty="0"/>
+              <a:t>Line 26.5</a:t>
+            </a:r>
+          </a:p>
+          <a:p>
+            <a:r>
+              <a:rPr lang="en-US" sz="1000" b="1" dirty="0">
+                <a:solidFill>
+                  <a:srgbClr val="7933CE"/>
+                </a:solidFill>
+              </a:rPr>
               <a:t>13.</a:t>
             </a:r>
-          </a:p>
-          <a:p>
-            <a:r>
-              <a:rPr lang="en-US" sz="1200" dirty="0" smtClean="0"/>
-              <a:t>14.</a:t>
-            </a:r>
-          </a:p>
-          <a:p>
-            <a:r>
-              <a:rPr lang="en-US" sz="1200" dirty="0" smtClean="0"/>
-              <a:t>15.</a:t>
-            </a:r>
-          </a:p>
-          <a:p>
-            <a:r>
-              <a:rPr lang="en-US" sz="1200" dirty="0" smtClean="0"/>
+            <a:r>
+              <a:rPr lang="en-US" sz="1000" b="1" dirty="0" smtClean="0">
+                <a:solidFill>
+                  <a:srgbClr val="FF0000"/>
+                </a:solidFill>
+              </a:rPr>
+              <a:t> </a:t>
+            </a:r>
+            <a:r>
+              <a:rPr lang="en-US" sz="1000" dirty="0"/>
+              <a:t>Navigator Tab &gt; Left </a:t>
+            </a:r>
+            <a:r>
+              <a:rPr lang="en-US" sz="1000" dirty="0" err="1"/>
+              <a:t>Tabwell</a:t>
+            </a:r>
+            <a:endParaRPr lang="en-US" sz="1000" dirty="0"/>
+          </a:p>
+          <a:p>
+            <a:r>
+              <a:rPr lang="en-US" sz="1000" b="1" dirty="0" smtClean="0">
+                <a:solidFill>
+                  <a:srgbClr val="FF0000"/>
+                </a:solidFill>
+              </a:rPr>
+              <a:t>14</a:t>
+            </a:r>
+            <a:r>
+              <a:rPr lang="en-US" sz="1000" b="1" dirty="0" smtClean="0">
+                <a:solidFill>
+                  <a:srgbClr val="FF0000"/>
+                </a:solidFill>
+              </a:rPr>
+              <a:t>. </a:t>
+            </a:r>
+            <a:r>
+              <a:rPr lang="en-US" sz="1000" dirty="0"/>
+              <a:t>Main Window</a:t>
+            </a:r>
+          </a:p>
+          <a:p>
+            <a:r>
+              <a:rPr lang="en-US" sz="1000" b="1" dirty="0">
+                <a:solidFill>
+                  <a:srgbClr val="7933CE"/>
+                </a:solidFill>
+              </a:rPr>
+              <a:t>1</a:t>
+            </a:r>
+            <a:r>
+              <a:rPr lang="en-US" sz="1000" b="1" dirty="0">
+                <a:solidFill>
+                  <a:srgbClr val="7933CE"/>
+                </a:solidFill>
+              </a:rPr>
+              <a:t>5</a:t>
+            </a:r>
+            <a:r>
+              <a:rPr lang="en-US" sz="1000" b="1" dirty="0">
+                <a:solidFill>
+                  <a:srgbClr val="7933CE"/>
+                </a:solidFill>
+              </a:rPr>
+              <a:t>. </a:t>
+            </a:r>
+            <a:r>
+              <a:rPr lang="en-US" sz="1000" dirty="0"/>
+              <a:t>History Tab &gt; Bottom </a:t>
+            </a:r>
+            <a:r>
+              <a:rPr lang="en-US" sz="1000" dirty="0" err="1"/>
+              <a:t>Tabwell</a:t>
+            </a:r>
+            <a:endParaRPr lang="en-US" sz="1000" dirty="0"/>
+          </a:p>
+          <a:p>
+            <a:r>
+              <a:rPr lang="en-US" sz="1000" b="1" dirty="0">
+                <a:solidFill>
+                  <a:srgbClr val="7933CE"/>
+                </a:solidFill>
+              </a:rPr>
               <a:t>16.</a:t>
             </a:r>
+            <a:r>
+              <a:rPr lang="en-US" sz="1000" b="1" dirty="0" smtClean="0">
+                <a:solidFill>
+                  <a:srgbClr val="FF0000"/>
+                </a:solidFill>
+              </a:rPr>
+              <a:t> </a:t>
+            </a:r>
+            <a:r>
+              <a:rPr lang="en-US" sz="1000" dirty="0"/>
+              <a:t>Console Tab </a:t>
+            </a:r>
+            <a:r>
+              <a:rPr lang="en-US" sz="1000" dirty="0" smtClean="0"/>
+              <a:t>&gt; Bottom </a:t>
+            </a:r>
+            <a:r>
+              <a:rPr lang="en-US" sz="1000" dirty="0" err="1" smtClean="0"/>
+              <a:t>Tabwell</a:t>
+            </a:r>
+            <a:r>
+              <a:rPr lang="en-US" sz="1000" dirty="0" smtClean="0"/>
+              <a:t> &gt; </a:t>
+            </a:r>
+            <a:r>
+              <a:rPr lang="en-US" sz="1000" dirty="0"/>
+              <a:t>Toolbar &gt; Pin Console</a:t>
+            </a:r>
+          </a:p>
+          <a:p>
+            <a:r>
+              <a:rPr lang="en-US" sz="1000" b="1" dirty="0">
+                <a:solidFill>
+                  <a:srgbClr val="7933CE"/>
+                </a:solidFill>
+              </a:rPr>
+              <a:t>17.</a:t>
+            </a:r>
+            <a:r>
+              <a:rPr lang="en-US" sz="1000" b="1" dirty="0" smtClean="0">
+                <a:solidFill>
+                  <a:srgbClr val="FF0000"/>
+                </a:solidFill>
+              </a:rPr>
+              <a:t> </a:t>
+            </a:r>
+            <a:r>
+              <a:rPr lang="en-US" sz="1000" dirty="0"/>
+              <a:t>Console </a:t>
+            </a:r>
+            <a:r>
+              <a:rPr lang="en-US" sz="1000" dirty="0" err="1"/>
+              <a:t>Tabwell</a:t>
+            </a:r>
+            <a:r>
+              <a:rPr lang="en-US" sz="1000" dirty="0"/>
+              <a:t>  &gt; Bottom </a:t>
+            </a:r>
+            <a:r>
+              <a:rPr lang="en-US" sz="1000" dirty="0" err="1"/>
+              <a:t>Tabwell</a:t>
+            </a:r>
+            <a:endParaRPr lang="en-US" sz="1000" dirty="0"/>
+          </a:p>
+          <a:p>
+            <a:r>
+              <a:rPr lang="en-US" sz="1000" b="1" dirty="0">
+                <a:solidFill>
+                  <a:srgbClr val="7933CE"/>
+                </a:solidFill>
+              </a:rPr>
+              <a:t>18. </a:t>
+            </a:r>
+            <a:r>
+              <a:rPr lang="en-US" sz="1000" dirty="0" smtClean="0">
+                <a:solidFill>
+                  <a:srgbClr val="000000"/>
+                </a:solidFill>
+              </a:rPr>
+              <a:t>Dock &gt; Skype</a:t>
+            </a:r>
+            <a:endParaRPr lang="en-US" sz="1000" dirty="0" smtClean="0">
+              <a:solidFill>
+                <a:srgbClr val="000000"/>
+              </a:solidFill>
+            </a:endParaRPr>
           </a:p>
           <a:p>
             <a:endParaRPr lang="en-US" sz="1200" dirty="0" smtClean="0"/>
@@ -4598,6 +5083,304 @@
           </a:p>
         </p:txBody>
       </p:sp>
+      <p:sp>
+        <p:nvSpPr>
+          <p:cNvPr id="24" name="Rectangle 23"/>
+          <p:cNvSpPr/>
+          <p:nvPr/>
+        </p:nvSpPr>
+        <p:spPr>
+          <a:xfrm>
+            <a:off x="2597094" y="2573027"/>
+            <a:ext cx="340658" cy="276999"/>
+          </a:xfrm>
+          <a:prstGeom prst="rect">
+            <a:avLst/>
+          </a:prstGeom>
+          <a:noFill/>
+        </p:spPr>
+        <p:txBody>
+          <a:bodyPr wrap="none" lIns="91440" tIns="45720" rIns="91440" bIns="45720">
+            <a:spAutoFit/>
+          </a:bodyPr>
+          <a:lstStyle/>
+          <a:p>
+            <a:pPr algn="ctr"/>
+            <a:r>
+              <a:rPr lang="x-none" sz="1200" b="1" dirty="0" smtClean="0">
+                <a:ln w="18000">
+                  <a:solidFill>
+                    <a:schemeClr val="accent2">
+                      <a:satMod val="140000"/>
+                    </a:schemeClr>
+                  </a:solidFill>
+                  <a:prstDash val="solid"/>
+                  <a:miter lim="800000"/>
+                </a:ln>
+                <a:noFill/>
+                <a:effectLst>
+                  <a:outerShdw blurRad="25500" dist="23000" dir="7020000" algn="tl">
+                    <a:srgbClr val="000000">
+                      <a:alpha val="50000"/>
+                    </a:srgbClr>
+                  </a:outerShdw>
+                </a:effectLst>
+              </a:rPr>
+              <a:t>12</a:t>
+            </a:r>
+            <a:endParaRPr lang="x-none" sz="1200" b="1" dirty="0">
+              <a:ln w="18000">
+                <a:solidFill>
+                  <a:schemeClr val="accent2">
+                    <a:satMod val="140000"/>
+                  </a:schemeClr>
+                </a:solidFill>
+                <a:prstDash val="solid"/>
+                <a:miter lim="800000"/>
+              </a:ln>
+              <a:noFill/>
+              <a:effectLst>
+                <a:outerShdw blurRad="25500" dist="23000" dir="7020000" algn="tl">
+                  <a:srgbClr val="000000">
+                    <a:alpha val="50000"/>
+                  </a:srgbClr>
+                </a:outerShdw>
+              </a:effectLst>
+            </a:endParaRPr>
+          </a:p>
+        </p:txBody>
+      </p:sp>
+      <p:sp>
+        <p:nvSpPr>
+          <p:cNvPr id="25" name="Rectangle 24"/>
+          <p:cNvSpPr/>
+          <p:nvPr/>
+        </p:nvSpPr>
+        <p:spPr>
+          <a:xfrm>
+            <a:off x="3936755" y="4230257"/>
+            <a:ext cx="340658" cy="276999"/>
+          </a:xfrm>
+          <a:prstGeom prst="rect">
+            <a:avLst/>
+          </a:prstGeom>
+          <a:noFill/>
+        </p:spPr>
+        <p:txBody>
+          <a:bodyPr wrap="none" lIns="91440" tIns="45720" rIns="91440" bIns="45720">
+            <a:spAutoFit/>
+          </a:bodyPr>
+          <a:lstStyle/>
+          <a:p>
+            <a:pPr algn="ctr"/>
+            <a:r>
+              <a:rPr lang="x-none" sz="1200" b="1" dirty="0" smtClean="0">
+                <a:ln w="18000">
+                  <a:solidFill>
+                    <a:schemeClr val="accent2">
+                      <a:satMod val="140000"/>
+                    </a:schemeClr>
+                  </a:solidFill>
+                  <a:prstDash val="solid"/>
+                  <a:miter lim="800000"/>
+                </a:ln>
+                <a:noFill/>
+                <a:effectLst>
+                  <a:outerShdw blurRad="25500" dist="23000" dir="7020000" algn="tl">
+                    <a:srgbClr val="000000">
+                      <a:alpha val="50000"/>
+                    </a:srgbClr>
+                  </a:outerShdw>
+                </a:effectLst>
+              </a:rPr>
+              <a:t>14</a:t>
+            </a:r>
+            <a:endParaRPr lang="x-none" sz="1200" b="1" dirty="0">
+              <a:ln w="18000">
+                <a:solidFill>
+                  <a:schemeClr val="accent2">
+                    <a:satMod val="140000"/>
+                  </a:schemeClr>
+                </a:solidFill>
+                <a:prstDash val="solid"/>
+                <a:miter lim="800000"/>
+              </a:ln>
+              <a:noFill/>
+              <a:effectLst>
+                <a:outerShdw blurRad="25500" dist="23000" dir="7020000" algn="tl">
+                  <a:srgbClr val="000000">
+                    <a:alpha val="50000"/>
+                  </a:srgbClr>
+                </a:outerShdw>
+              </a:effectLst>
+            </a:endParaRPr>
+          </a:p>
+        </p:txBody>
+      </p:sp>
+      <p:sp>
+        <p:nvSpPr>
+          <p:cNvPr id="3" name="Oval 2"/>
+          <p:cNvSpPr/>
+          <p:nvPr/>
+        </p:nvSpPr>
+        <p:spPr>
+          <a:xfrm>
+            <a:off x="2166904" y="207015"/>
+            <a:ext cx="113195" cy="119315"/>
+          </a:xfrm>
+          <a:prstGeom prst="ellipse">
+            <a:avLst/>
+          </a:prstGeom>
+          <a:noFill/>
+        </p:spPr>
+        <p:style>
+          <a:lnRef idx="1">
+            <a:schemeClr val="accent2"/>
+          </a:lnRef>
+          <a:fillRef idx="3">
+            <a:schemeClr val="accent2"/>
+          </a:fillRef>
+          <a:effectRef idx="2">
+            <a:schemeClr val="accent2"/>
+          </a:effectRef>
+          <a:fontRef idx="minor">
+            <a:schemeClr val="lt1"/>
+          </a:fontRef>
+        </p:style>
+        <p:txBody>
+          <a:bodyPr rtlCol="0" anchor="ctr"/>
+          <a:lstStyle/>
+          <a:p>
+            <a:pPr algn="ctr"/>
+            <a:endParaRPr lang="en-US"/>
+          </a:p>
+        </p:txBody>
+      </p:sp>
+      <p:sp>
+        <p:nvSpPr>
+          <p:cNvPr id="5" name="TextBox 4"/>
+          <p:cNvSpPr txBox="1"/>
+          <p:nvPr/>
+        </p:nvSpPr>
+        <p:spPr>
+          <a:xfrm>
+            <a:off x="7490795" y="5674597"/>
+            <a:ext cx="1274708" cy="553998"/>
+          </a:xfrm>
+          <a:prstGeom prst="rect">
+            <a:avLst/>
+          </a:prstGeom>
+          <a:noFill/>
+        </p:spPr>
+        <p:txBody>
+          <a:bodyPr wrap="none" rtlCol="0">
+            <a:spAutoFit/>
+          </a:bodyPr>
+          <a:lstStyle/>
+          <a:p>
+            <a:r>
+              <a:rPr lang="en-US" sz="1200" dirty="0" smtClean="0">
+                <a:solidFill>
+                  <a:srgbClr val="7933CE"/>
+                </a:solidFill>
+                <a:latin typeface="Edwardian Script ITC"/>
+                <a:cs typeface="Edwardian Script ITC"/>
+              </a:rPr>
+              <a:t>Made by:</a:t>
+            </a:r>
+          </a:p>
+          <a:p>
+            <a:r>
+              <a:rPr lang="en-US" dirty="0" smtClean="0">
+                <a:solidFill>
+                  <a:srgbClr val="7933CE"/>
+                </a:solidFill>
+                <a:latin typeface="Edwardian Script ITC"/>
+                <a:cs typeface="Edwardian Script ITC"/>
+              </a:rPr>
+              <a:t>LlewellynFalco</a:t>
+            </a:r>
+          </a:p>
+        </p:txBody>
+      </p:sp>
+      <p:sp>
+        <p:nvSpPr>
+          <p:cNvPr id="17" name="Rectangle 16"/>
+          <p:cNvSpPr/>
+          <p:nvPr/>
+        </p:nvSpPr>
+        <p:spPr>
+          <a:xfrm>
+            <a:off x="5041369" y="6079399"/>
+            <a:ext cx="3839513" cy="369332"/>
+          </a:xfrm>
+          <a:prstGeom prst="rect">
+            <a:avLst/>
+          </a:prstGeom>
+        </p:spPr>
+        <p:txBody>
+          <a:bodyPr wrap="none">
+            <a:spAutoFit/>
+          </a:bodyPr>
+          <a:lstStyle/>
+          <a:p>
+            <a:r>
+              <a:rPr lang="en-US" dirty="0">
+                <a:solidFill>
+                  <a:srgbClr val="8B6DAF"/>
+                </a:solidFill>
+                <a:latin typeface="Edwardian Script ITC"/>
+                <a:cs typeface="Edwardian Script ITC"/>
+              </a:rPr>
+              <a:t>This is a work in progress, please send suggestions via twitter</a:t>
+            </a:r>
+            <a:endParaRPr lang="en-US" dirty="0">
+              <a:solidFill>
+                <a:srgbClr val="8B6DAF"/>
+              </a:solidFill>
+              <a:latin typeface="Edwardian Script ITC"/>
+              <a:cs typeface="Edwardian Script ITC"/>
+            </a:endParaRPr>
+          </a:p>
+        </p:txBody>
+      </p:sp>
+      <p:cxnSp>
+        <p:nvCxnSpPr>
+          <p:cNvPr id="27" name="Straight Arrow Connector 26"/>
+          <p:cNvCxnSpPr/>
+          <p:nvPr/>
+        </p:nvCxnSpPr>
+        <p:spPr>
+          <a:xfrm flipH="1">
+            <a:off x="2280099" y="2727325"/>
+            <a:ext cx="358870" cy="0"/>
+          </a:xfrm>
+          <a:prstGeom prst="straightConnector1">
+            <a:avLst/>
+          </a:prstGeom>
+          <a:ln w="3175" cmpd="sng">
+            <a:solidFill>
+              <a:srgbClr val="FF0000"/>
+            </a:solidFill>
+            <a:headEnd type="none"/>
+            <a:tailEnd type="triangle"/>
+          </a:ln>
+        </p:spPr>
+        <p:style>
+          <a:lnRef idx="2">
+            <a:schemeClr val="accent1"/>
+          </a:lnRef>
+          <a:fillRef idx="0">
+            <a:schemeClr val="accent1"/>
+          </a:fillRef>
+          <a:effectRef idx="1">
+            <a:schemeClr val="accent1"/>
+          </a:effectRef>
+          <a:fontRef idx="minor">
+            <a:schemeClr val="tx1"/>
+          </a:fontRef>
+        </p:style>
+      </p:cxnSp>
     </p:spTree>
     <p:extLst>
       <p:ext uri="{BB962C8B-B14F-4D97-AF65-F5344CB8AC3E}">

</xml_diff>